<commit_message>
workspace update 24 mars 2025
</commit_message>
<xml_diff>
--- a/slides/archive/17_03_2025_genscale.pptx
+++ b/slides/archive/17_03_2025_genscale.pptx
@@ -297,7 +297,7 @@
           <a:p>
             <a:fld id="{FF462FCB-4E82-244A-8604-DBE5753E9367}" type="datetimeFigureOut">
               <a:rPr lang="en-FR" smtClean="0"/>
-              <a:t>16/03/2025</a:t>
+              <a:t>18/03/2025</a:t>
             </a:fld>
             <a:endParaRPr lang="en-FR"/>
           </a:p>
@@ -2472,7 +2472,7 @@
           <a:p>
             <a:fld id="{FB37A0A7-98B0-7B43-A76A-039A86DACCF8}" type="datetime1">
               <a:rPr lang="fr-FR" smtClean="0"/>
-              <a:t>16/03/2025</a:t>
+              <a:t>18/03/2025</a:t>
             </a:fld>
             <a:endParaRPr lang="en-FR"/>
           </a:p>
@@ -2688,7 +2688,7 @@
           <a:p>
             <a:fld id="{1B7EA9D0-A84A-0B48-9D25-C382A13B2298}" type="datetime1">
               <a:rPr lang="fr-FR" smtClean="0"/>
-              <a:t>16/03/2025</a:t>
+              <a:t>18/03/2025</a:t>
             </a:fld>
             <a:endParaRPr lang="en-FR"/>
           </a:p>
@@ -2898,7 +2898,7 @@
           <a:p>
             <a:fld id="{3F3B9188-7214-C845-AE16-A7E84B49F072}" type="datetime1">
               <a:rPr lang="fr-FR" smtClean="0"/>
-              <a:t>16/03/2025</a:t>
+              <a:t>18/03/2025</a:t>
             </a:fld>
             <a:endParaRPr lang="en-FR"/>
           </a:p>
@@ -3098,7 +3098,7 @@
           <a:p>
             <a:fld id="{B965CC8F-7F4B-1C4F-9680-A57448D58B7A}" type="datetime1">
               <a:rPr lang="fr-FR" smtClean="0"/>
-              <a:t>16/03/2025</a:t>
+              <a:t>18/03/2025</a:t>
             </a:fld>
             <a:endParaRPr lang="en-FR"/>
           </a:p>
@@ -3374,7 +3374,7 @@
           <a:p>
             <a:fld id="{618477F5-F867-9A49-BFB3-CB7A9A8F2DE9}" type="datetime1">
               <a:rPr lang="fr-FR" smtClean="0"/>
-              <a:t>16/03/2025</a:t>
+              <a:t>18/03/2025</a:t>
             </a:fld>
             <a:endParaRPr lang="en-FR"/>
           </a:p>
@@ -3642,7 +3642,7 @@
           <a:p>
             <a:fld id="{56DB746C-F0E9-BA40-AAF8-A000CA38AEAA}" type="datetime1">
               <a:rPr lang="fr-FR" smtClean="0"/>
-              <a:t>16/03/2025</a:t>
+              <a:t>18/03/2025</a:t>
             </a:fld>
             <a:endParaRPr lang="en-FR"/>
           </a:p>
@@ -4057,7 +4057,7 @@
           <a:p>
             <a:fld id="{FBEABF7A-BACF-754F-A954-31F89B6A2934}" type="datetime1">
               <a:rPr lang="fr-FR" smtClean="0"/>
-              <a:t>16/03/2025</a:t>
+              <a:t>18/03/2025</a:t>
             </a:fld>
             <a:endParaRPr lang="en-FR"/>
           </a:p>
@@ -4199,7 +4199,7 @@
           <a:p>
             <a:fld id="{5DFDA926-EE3D-CD4E-AB4D-2C2D2340CE46}" type="datetime1">
               <a:rPr lang="fr-FR" smtClean="0"/>
-              <a:t>16/03/2025</a:t>
+              <a:t>18/03/2025</a:t>
             </a:fld>
             <a:endParaRPr lang="en-FR"/>
           </a:p>
@@ -4312,7 +4312,7 @@
           <a:p>
             <a:fld id="{A48E899B-7420-9244-BCE2-E2BEFB45547A}" type="datetime1">
               <a:rPr lang="fr-FR" smtClean="0"/>
-              <a:t>16/03/2025</a:t>
+              <a:t>18/03/2025</a:t>
             </a:fld>
             <a:endParaRPr lang="en-FR"/>
           </a:p>
@@ -4625,7 +4625,7 @@
           <a:p>
             <a:fld id="{49873A6B-3B60-1E49-A32E-3D4EC9C5F57F}" type="datetime1">
               <a:rPr lang="fr-FR" smtClean="0"/>
-              <a:t>16/03/2025</a:t>
+              <a:t>18/03/2025</a:t>
             </a:fld>
             <a:endParaRPr lang="en-FR"/>
           </a:p>
@@ -4914,7 +4914,7 @@
           <a:p>
             <a:fld id="{5B8B0EC9-00C0-AD47-8D54-B6493B5EDB22}" type="datetime1">
               <a:rPr lang="fr-FR" smtClean="0"/>
-              <a:t>16/03/2025</a:t>
+              <a:t>18/03/2025</a:t>
             </a:fld>
             <a:endParaRPr lang="en-FR"/>
           </a:p>
@@ -5157,7 +5157,7 @@
           <a:p>
             <a:fld id="{39E8FB15-9EE3-D448-9C3C-4149DC7DBA1E}" type="datetime1">
               <a:rPr lang="fr-FR" smtClean="0"/>
-              <a:t>16/03/2025</a:t>
+              <a:t>18/03/2025</a:t>
             </a:fld>
             <a:endParaRPr lang="en-FR"/>
           </a:p>
@@ -11899,8 +11899,8 @@
           </a:p>
         </p:txBody>
       </p:sp>
-      <mc:AlternateContent xmlns:mc="http://schemas.openxmlformats.org/markup-compatibility/2006">
-        <mc:Choice xmlns:a14="http://schemas.microsoft.com/office/drawing/2010/main" Requires="a14">
+      <mc:AlternateContent xmlns:mc="http://schemas.openxmlformats.org/markup-compatibility/2006" xmlns:a14="http://schemas.microsoft.com/office/drawing/2010/main">
+        <mc:Choice Requires="a14">
           <p:sp>
             <p:nvSpPr>
               <p:cNvPr id="51" name="Content Placeholder 2">
@@ -12124,7 +12124,7 @@
             </p:txBody>
           </p:sp>
         </mc:Choice>
-        <mc:Fallback>
+        <mc:Fallback xmlns="">
           <p:sp>
             <p:nvSpPr>
               <p:cNvPr id="51" name="Content Placeholder 2">
@@ -12373,6 +12373,57 @@
                 <a:latin typeface="Times New Roman" panose="02020603050405020304" pitchFamily="18" charset="0"/>
               </a:rPr>
               <a:t>1000 genomes in each dustbin</a:t>
+            </a:r>
+          </a:p>
+        </p:txBody>
+      </p:sp>
+      <p:sp>
+        <p:nvSpPr>
+          <p:cNvPr id="6" name="Rectangle 5">
+            <a:extLst>
+              <a:ext uri="{FF2B5EF4-FFF2-40B4-BE49-F238E27FC236}">
+                <a16:creationId xmlns:a16="http://schemas.microsoft.com/office/drawing/2014/main" id="{006E1987-AF90-A503-CCC8-24ED8EF2CED5}"/>
+              </a:ext>
+            </a:extLst>
+          </p:cNvPr>
+          <p:cNvSpPr/>
+          <p:nvPr/>
+        </p:nvSpPr>
+        <p:spPr>
+          <a:xfrm>
+            <a:off x="7807629" y="2906591"/>
+            <a:ext cx="3709639" cy="1673690"/>
+          </a:xfrm>
+          <a:prstGeom prst="rect">
+            <a:avLst/>
+          </a:prstGeom>
+        </p:spPr>
+        <p:style>
+          <a:lnRef idx="2">
+            <a:schemeClr val="dk1"/>
+          </a:lnRef>
+          <a:fillRef idx="1">
+            <a:schemeClr val="lt1"/>
+          </a:fillRef>
+          <a:effectRef idx="0">
+            <a:schemeClr val="dk1"/>
+          </a:effectRef>
+          <a:fontRef idx="minor">
+            <a:schemeClr val="dk1"/>
+          </a:fontRef>
+        </p:style>
+        <p:txBody>
+          <a:bodyPr rtlCol="0" anchor="ctr"/>
+          <a:lstStyle/>
+          <a:p>
+            <a:pPr algn="ctr"/>
+            <a:r>
+              <a:rPr lang="en-FR" dirty="0">
+                <a:solidFill>
+                  <a:srgbClr val="C00000"/>
+                </a:solidFill>
+              </a:rPr>
+              <a:t>More time on the concept of batches</a:t>
             </a:r>
           </a:p>
         </p:txBody>
@@ -26799,6 +26850,57 @@
           </a:p>
         </p:txBody>
       </p:sp>
+      <p:sp>
+        <p:nvSpPr>
+          <p:cNvPr id="23" name="Rectangle 22">
+            <a:extLst>
+              <a:ext uri="{FF2B5EF4-FFF2-40B4-BE49-F238E27FC236}">
+                <a16:creationId xmlns:a16="http://schemas.microsoft.com/office/drawing/2014/main" id="{14922EAB-C751-E1E8-5604-6907AFF9E041}"/>
+              </a:ext>
+            </a:extLst>
+          </p:cNvPr>
+          <p:cNvSpPr/>
+          <p:nvPr/>
+        </p:nvSpPr>
+        <p:spPr>
+          <a:xfrm>
+            <a:off x="4090058" y="2954267"/>
+            <a:ext cx="3709639" cy="1673690"/>
+          </a:xfrm>
+          <a:prstGeom prst="rect">
+            <a:avLst/>
+          </a:prstGeom>
+        </p:spPr>
+        <p:style>
+          <a:lnRef idx="2">
+            <a:schemeClr val="dk1"/>
+          </a:lnRef>
+          <a:fillRef idx="1">
+            <a:schemeClr val="lt1"/>
+          </a:fillRef>
+          <a:effectRef idx="0">
+            <a:schemeClr val="dk1"/>
+          </a:effectRef>
+          <a:fontRef idx="minor">
+            <a:schemeClr val="dk1"/>
+          </a:fontRef>
+        </p:style>
+        <p:txBody>
+          <a:bodyPr rtlCol="0" anchor="ctr"/>
+          <a:lstStyle/>
+          <a:p>
+            <a:pPr algn="ctr"/>
+            <a:r>
+              <a:rPr lang="en-FR" dirty="0">
+                <a:solidFill>
+                  <a:srgbClr val="C00000"/>
+                </a:solidFill>
+              </a:rPr>
+              <a:t>More time on the concept of batches/bins</a:t>
+            </a:r>
+          </a:p>
+        </p:txBody>
+      </p:sp>
     </p:spTree>
     <p:extLst>
       <p:ext uri="{BB962C8B-B14F-4D97-AF65-F5344CB8AC3E}">
@@ -26857,8 +26959,8 @@
           </a:p>
         </p:txBody>
       </p:sp>
-      <mc:AlternateContent xmlns:mc="http://schemas.openxmlformats.org/markup-compatibility/2006">
-        <mc:Choice xmlns:a14="http://schemas.microsoft.com/office/drawing/2010/main" Requires="a14">
+      <mc:AlternateContent xmlns:mc="http://schemas.openxmlformats.org/markup-compatibility/2006" xmlns:a14="http://schemas.microsoft.com/office/drawing/2010/main">
+        <mc:Choice Requires="a14">
           <p:sp>
             <p:nvSpPr>
               <p:cNvPr id="3" name="Content Placeholder 2">
@@ -27196,7 +27298,7 @@
             </p:txBody>
           </p:sp>
         </mc:Choice>
-        <mc:Fallback>
+        <mc:Fallback xmlns="">
           <p:sp>
             <p:nvSpPr>
               <p:cNvPr id="3" name="Content Placeholder 2">
@@ -27333,8 +27435,8 @@
           </a:p>
         </p:txBody>
       </p:sp>
-      <mc:AlternateContent xmlns:mc="http://schemas.openxmlformats.org/markup-compatibility/2006">
-        <mc:Choice xmlns:a14="http://schemas.microsoft.com/office/drawing/2010/main" Requires="a14">
+      <mc:AlternateContent xmlns:mc="http://schemas.openxmlformats.org/markup-compatibility/2006" xmlns:a14="http://schemas.microsoft.com/office/drawing/2010/main">
+        <mc:Choice Requires="a14">
           <p:sp>
             <p:nvSpPr>
               <p:cNvPr id="3" name="Content Placeholder 2">
@@ -27672,7 +27774,7 @@
             </p:txBody>
           </p:sp>
         </mc:Choice>
-        <mc:Fallback>
+        <mc:Fallback xmlns="">
           <p:sp>
             <p:nvSpPr>
               <p:cNvPr id="3" name="Content Placeholder 2">
@@ -27867,8 +27969,8 @@
           </a:p>
         </p:txBody>
       </p:sp>
-      <mc:AlternateContent xmlns:mc="http://schemas.openxmlformats.org/markup-compatibility/2006">
-        <mc:Choice xmlns:a14="http://schemas.microsoft.com/office/drawing/2010/main" Requires="a14">
+      <mc:AlternateContent xmlns:mc="http://schemas.openxmlformats.org/markup-compatibility/2006" xmlns:a14="http://schemas.microsoft.com/office/drawing/2010/main">
+        <mc:Choice Requires="a14">
           <p:sp>
             <p:nvSpPr>
               <p:cNvPr id="3" name="Content Placeholder 2">
@@ -28206,7 +28308,7 @@
             </p:txBody>
           </p:sp>
         </mc:Choice>
-        <mc:Fallback>
+        <mc:Fallback xmlns="">
           <p:sp>
             <p:nvSpPr>
               <p:cNvPr id="3" name="Content Placeholder 2">
@@ -28337,8 +28439,8 @@
           </a:prstGeom>
         </p:spPr>
       </p:pic>
-      <mc:AlternateContent xmlns:mc="http://schemas.openxmlformats.org/markup-compatibility/2006">
-        <mc:Choice xmlns:a14="http://schemas.microsoft.com/office/drawing/2010/main" Requires="a14">
+      <mc:AlternateContent xmlns:mc="http://schemas.openxmlformats.org/markup-compatibility/2006" xmlns:a14="http://schemas.microsoft.com/office/drawing/2010/main">
+        <mc:Choice Requires="a14">
           <p:sp>
             <p:nvSpPr>
               <p:cNvPr id="9" name="Content Placeholder 2">
@@ -28692,7 +28794,7 @@
             </p:txBody>
           </p:sp>
         </mc:Choice>
-        <mc:Fallback>
+        <mc:Fallback xmlns="">
           <p:sp>
             <p:nvSpPr>
               <p:cNvPr id="9" name="Content Placeholder 2">
@@ -28942,8 +29044,8 @@
           </a:p>
         </p:txBody>
       </p:sp>
-      <mc:AlternateContent xmlns:mc="http://schemas.openxmlformats.org/markup-compatibility/2006">
-        <mc:Choice xmlns:a14="http://schemas.microsoft.com/office/drawing/2010/main" Requires="a14">
+      <mc:AlternateContent xmlns:mc="http://schemas.openxmlformats.org/markup-compatibility/2006" xmlns:a14="http://schemas.microsoft.com/office/drawing/2010/main">
+        <mc:Choice Requires="a14">
           <p:sp>
             <p:nvSpPr>
               <p:cNvPr id="11" name="TextBox 10">
@@ -28972,6 +29074,7 @@
               </a:bodyPr>
               <a:lstStyle/>
               <a:p>
+                <a:pPr/>
                 <a14:m>
                   <m:oMathPara xmlns:m="http://schemas.openxmlformats.org/officeDocument/2006/math">
                     <m:oMathParaPr>
@@ -29070,7 +29173,7 @@
             </p:txBody>
           </p:sp>
         </mc:Choice>
-        <mc:Fallback>
+        <mc:Fallback xmlns="">
           <p:sp>
             <p:nvSpPr>
               <p:cNvPr id="11" name="TextBox 10">
@@ -29179,8 +29282,8 @@
           </a:p>
         </p:txBody>
       </p:sp>
-      <mc:AlternateContent xmlns:mc="http://schemas.openxmlformats.org/markup-compatibility/2006">
-        <mc:Choice xmlns:a14="http://schemas.microsoft.com/office/drawing/2010/main" Requires="a14">
+      <mc:AlternateContent xmlns:mc="http://schemas.openxmlformats.org/markup-compatibility/2006" xmlns:a14="http://schemas.microsoft.com/office/drawing/2010/main">
+        <mc:Choice Requires="a14">
           <p:sp>
             <p:nvSpPr>
               <p:cNvPr id="3" name="Content Placeholder 2">
@@ -29518,7 +29621,7 @@
             </p:txBody>
           </p:sp>
         </mc:Choice>
-        <mc:Fallback>
+        <mc:Fallback xmlns="">
           <p:sp>
             <p:nvSpPr>
               <p:cNvPr id="3" name="Content Placeholder 2">
@@ -29649,8 +29752,8 @@
           </a:prstGeom>
         </p:spPr>
       </p:pic>
-      <mc:AlternateContent xmlns:mc="http://schemas.openxmlformats.org/markup-compatibility/2006">
-        <mc:Choice xmlns:a14="http://schemas.microsoft.com/office/drawing/2010/main" Requires="a14">
+      <mc:AlternateContent xmlns:mc="http://schemas.openxmlformats.org/markup-compatibility/2006" xmlns:a14="http://schemas.microsoft.com/office/drawing/2010/main">
+        <mc:Choice Requires="a14">
           <p:sp>
             <p:nvSpPr>
               <p:cNvPr id="9" name="Content Placeholder 2">
@@ -30037,7 +30140,7 @@
             </p:txBody>
           </p:sp>
         </mc:Choice>
-        <mc:Fallback>
+        <mc:Fallback xmlns="">
           <p:sp>
             <p:nvSpPr>
               <p:cNvPr id="9" name="Content Placeholder 2">
@@ -30287,8 +30390,8 @@
           </a:p>
         </p:txBody>
       </p:sp>
-      <mc:AlternateContent xmlns:mc="http://schemas.openxmlformats.org/markup-compatibility/2006">
-        <mc:Choice xmlns:a14="http://schemas.microsoft.com/office/drawing/2010/main" Requires="a14">
+      <mc:AlternateContent xmlns:mc="http://schemas.openxmlformats.org/markup-compatibility/2006" xmlns:a14="http://schemas.microsoft.com/office/drawing/2010/main">
+        <mc:Choice Requires="a14">
           <p:sp>
             <p:nvSpPr>
               <p:cNvPr id="11" name="TextBox 10">
@@ -30317,6 +30420,7 @@
               </a:bodyPr>
               <a:lstStyle/>
               <a:p>
+                <a:pPr/>
                 <a14:m>
                   <m:oMathPara xmlns:m="http://schemas.openxmlformats.org/officeDocument/2006/math">
                     <m:oMathParaPr>
@@ -30415,7 +30519,7 @@
             </p:txBody>
           </p:sp>
         </mc:Choice>
-        <mc:Fallback>
+        <mc:Fallback xmlns="">
           <p:sp>
             <p:nvSpPr>
               <p:cNvPr id="11" name="TextBox 10">
@@ -30460,8 +30564,8 @@
           </p:sp>
         </mc:Fallback>
       </mc:AlternateContent>
-      <mc:AlternateContent xmlns:mc="http://schemas.openxmlformats.org/markup-compatibility/2006">
-        <mc:Choice xmlns:a14="http://schemas.microsoft.com/office/drawing/2010/main" Requires="a14">
+      <mc:AlternateContent xmlns:mc="http://schemas.openxmlformats.org/markup-compatibility/2006" xmlns:a14="http://schemas.microsoft.com/office/drawing/2010/main">
+        <mc:Choice Requires="a14">
           <p:sp>
             <p:nvSpPr>
               <p:cNvPr id="5" name="Rectangle 4">
@@ -30587,7 +30691,7 @@
             </p:txBody>
           </p:sp>
         </mc:Choice>
-        <mc:Fallback>
+        <mc:Fallback xmlns="">
           <p:sp>
             <p:nvSpPr>
               <p:cNvPr id="5" name="Rectangle 4">
@@ -31007,8 +31111,8 @@
           </a:p>
         </p:txBody>
       </p:sp>
-      <mc:AlternateContent xmlns:mc="http://schemas.openxmlformats.org/markup-compatibility/2006">
-        <mc:Choice xmlns:a14="http://schemas.microsoft.com/office/drawing/2010/main" Requires="a14">
+      <mc:AlternateContent xmlns:mc="http://schemas.openxmlformats.org/markup-compatibility/2006" xmlns:a14="http://schemas.microsoft.com/office/drawing/2010/main">
+        <mc:Choice Requires="a14">
           <p:sp>
             <p:nvSpPr>
               <p:cNvPr id="6" name="Content Placeholder 5">
@@ -31192,7 +31296,7 @@
             </p:txBody>
           </p:sp>
         </mc:Choice>
-        <mc:Fallback>
+        <mc:Fallback xmlns="">
           <p:sp>
             <p:nvSpPr>
               <p:cNvPr id="6" name="Content Placeholder 5">
@@ -33202,6 +33306,98 @@
           </a:p>
         </p:txBody>
       </p:sp>
+      <p:sp>
+        <p:nvSpPr>
+          <p:cNvPr id="3" name="Rectangle 2">
+            <a:extLst>
+              <a:ext uri="{FF2B5EF4-FFF2-40B4-BE49-F238E27FC236}">
+                <a16:creationId xmlns:a16="http://schemas.microsoft.com/office/drawing/2014/main" id="{08CAAFA5-294C-046C-8AE6-6D595E6CC4CF}"/>
+              </a:ext>
+            </a:extLst>
+          </p:cNvPr>
+          <p:cNvSpPr/>
+          <p:nvPr/>
+        </p:nvSpPr>
+        <p:spPr>
+          <a:xfrm>
+            <a:off x="7807629" y="2906591"/>
+            <a:ext cx="3709639" cy="1673690"/>
+          </a:xfrm>
+          <a:prstGeom prst="rect">
+            <a:avLst/>
+          </a:prstGeom>
+        </p:spPr>
+        <p:style>
+          <a:lnRef idx="2">
+            <a:schemeClr val="dk1"/>
+          </a:lnRef>
+          <a:fillRef idx="1">
+            <a:schemeClr val="lt1"/>
+          </a:fillRef>
+          <a:effectRef idx="0">
+            <a:schemeClr val="dk1"/>
+          </a:effectRef>
+          <a:fontRef idx="minor">
+            <a:schemeClr val="dk1"/>
+          </a:fontRef>
+        </p:style>
+        <p:txBody>
+          <a:bodyPr rtlCol="0" anchor="ctr"/>
+          <a:lstStyle/>
+          <a:p>
+            <a:pPr marL="342900" lvl="0" indent="-342900">
+              <a:buFont typeface="Symbol" pitchFamily="2" charset="2"/>
+              <a:buChar char=""/>
+            </a:pPr>
+            <a:r>
+              <a:rPr lang="en-US" sz="1800" kern="100" dirty="0">
+                <a:solidFill>
+                  <a:srgbClr val="C00000"/>
+                </a:solidFill>
+                <a:effectLst/>
+                <a:latin typeface="Calibri" panose="020F0502020204030204" pitchFamily="34" charset="0"/>
+                <a:ea typeface="Calibri" panose="020F0502020204030204" pitchFamily="34" charset="0"/>
+                <a:cs typeface="Times New Roman" panose="02020603050405020304" pitchFamily="18" charset="0"/>
+              </a:rPr>
+              <a:t>“a small subset of species” </a:t>
+            </a:r>
+            <a:r>
+              <a:rPr lang="en-US" sz="1800" kern="100" dirty="0">
+                <a:solidFill>
+                  <a:srgbClr val="C00000"/>
+                </a:solidFill>
+                <a:effectLst/>
+                <a:latin typeface="Calibri" panose="020F0502020204030204" pitchFamily="34" charset="0"/>
+                <a:ea typeface="Calibri" panose="020F0502020204030204" pitchFamily="34" charset="0"/>
+                <a:cs typeface="Times New Roman" panose="02020603050405020304" pitchFamily="18" charset="0"/>
+                <a:sym typeface="Wingdings" pitchFamily="2" charset="2"/>
+              </a:rPr>
+              <a:t></a:t>
+            </a:r>
+            <a:r>
+              <a:rPr lang="en-US" sz="1800" kern="100" dirty="0">
+                <a:solidFill>
+                  <a:srgbClr val="C00000"/>
+                </a:solidFill>
+                <a:effectLst/>
+                <a:latin typeface="Calibri" panose="020F0502020204030204" pitchFamily="34" charset="0"/>
+                <a:ea typeface="Calibri" panose="020F0502020204030204" pitchFamily="34" charset="0"/>
+                <a:cs typeface="Times New Roman" panose="02020603050405020304" pitchFamily="18" charset="0"/>
+              </a:rPr>
+              <a:t> be clear on how many percentages of the database is the small subset. This needs to be measure on 2 cases: pre-compression and post-compression size.</a:t>
+            </a:r>
+            <a:endParaRPr lang="en-FR" sz="1800" kern="100" dirty="0">
+              <a:solidFill>
+                <a:srgbClr val="C00000"/>
+              </a:solidFill>
+              <a:effectLst/>
+              <a:latin typeface="Calibri" panose="020F0502020204030204" pitchFamily="34" charset="0"/>
+              <a:ea typeface="Calibri" panose="020F0502020204030204" pitchFamily="34" charset="0"/>
+              <a:cs typeface="Times New Roman" panose="02020603050405020304" pitchFamily="18" charset="0"/>
+            </a:endParaRPr>
+          </a:p>
+        </p:txBody>
+      </p:sp>
     </p:spTree>
     <p:extLst>
       <p:ext uri="{BB962C8B-B14F-4D97-AF65-F5344CB8AC3E}">
@@ -33658,8 +33854,8 @@
           </a:p>
         </p:txBody>
       </p:sp>
-      <mc:AlternateContent xmlns:mc="http://schemas.openxmlformats.org/markup-compatibility/2006">
-        <mc:Choice xmlns:a14="http://schemas.microsoft.com/office/drawing/2010/main" Requires="a14">
+      <mc:AlternateContent xmlns:mc="http://schemas.openxmlformats.org/markup-compatibility/2006" xmlns:a14="http://schemas.microsoft.com/office/drawing/2010/main">
+        <mc:Choice Requires="a14">
           <p:sp>
             <p:nvSpPr>
               <p:cNvPr id="3" name="Content Placeholder 2">
@@ -33878,7 +34074,7 @@
             </p:txBody>
           </p:sp>
         </mc:Choice>
-        <mc:Fallback>
+        <mc:Fallback xmlns="">
           <p:sp>
             <p:nvSpPr>
               <p:cNvPr id="3" name="Content Placeholder 2">
@@ -33951,8 +34147,8 @@
           </a:p>
         </p:txBody>
       </p:sp>
-      <mc:AlternateContent xmlns:mc="http://schemas.openxmlformats.org/markup-compatibility/2006">
-        <mc:Choice xmlns:a14="http://schemas.microsoft.com/office/drawing/2010/main" Requires="a14">
+      <mc:AlternateContent xmlns:mc="http://schemas.openxmlformats.org/markup-compatibility/2006" xmlns:a14="http://schemas.microsoft.com/office/drawing/2010/main">
+        <mc:Choice Requires="a14">
           <p:sp>
             <p:nvSpPr>
               <p:cNvPr id="5" name="Content Placeholder 2">
@@ -34170,47 +34366,69 @@
                     </m:oMathParaPr>
                     <m:oMath xmlns:m="http://schemas.openxmlformats.org/officeDocument/2006/math">
                       <m:r>
-                        <a:rPr lang="en-GB" sz="1400" b="1" i="1" dirty="0" smtClean="0"/>
+                        <a:rPr lang="en-GB" sz="1400" b="1" i="1" dirty="0" smtClean="0">
+                          <a:latin typeface="Cambria Math" panose="02040503050406030204" pitchFamily="18" charset="0"/>
+                        </a:rPr>
                         <m:t>𝑴</m:t>
                       </m:r>
                       <m:r>
-                        <a:rPr lang="en-FR" sz="1400" b="1" i="1" dirty="0"/>
+                        <a:rPr lang="en-FR" sz="1400" b="1" i="1" dirty="0">
+                          <a:latin typeface="Cambria Math" panose="02040503050406030204" pitchFamily="18" charset="0"/>
+                        </a:rPr>
                         <m:t>𝒊𝒏𝒊𝒎𝒊𝒛𝒆</m:t>
                       </m:r>
                       <m:r>
-                        <a:rPr lang="en-US" sz="1400" b="1" i="1" dirty="0" smtClean="0"/>
+                        <a:rPr lang="en-US" sz="1400" b="1" i="1" dirty="0" smtClean="0">
+                          <a:latin typeface="Cambria Math" panose="02040503050406030204" pitchFamily="18" charset="0"/>
+                        </a:rPr>
                         <m:t> </m:t>
                       </m:r>
                       <m:r>
-                        <a:rPr lang="en-US" sz="1400" b="1" i="1" dirty="0" smtClean="0"/>
+                        <a:rPr lang="en-US" sz="1400" b="1" i="1" dirty="0" smtClean="0">
+                          <a:latin typeface="Cambria Math" panose="02040503050406030204" pitchFamily="18" charset="0"/>
+                        </a:rPr>
                         <m:t>𝒏𝒃</m:t>
                       </m:r>
                       <m:r>
-                        <a:rPr lang="en-US" sz="1400" b="1" i="1" dirty="0" smtClean="0"/>
+                        <a:rPr lang="en-US" sz="1400" b="1" i="1" dirty="0" smtClean="0">
+                          <a:latin typeface="Cambria Math" panose="02040503050406030204" pitchFamily="18" charset="0"/>
+                        </a:rPr>
                         <m:t> </m:t>
                       </m:r>
                       <m:r>
-                        <a:rPr lang="en-US" sz="1400" b="1" i="1" dirty="0" smtClean="0"/>
+                        <a:rPr lang="en-US" sz="1400" b="1" i="1" dirty="0" smtClean="0">
+                          <a:latin typeface="Cambria Math" panose="02040503050406030204" pitchFamily="18" charset="0"/>
+                        </a:rPr>
                         <m:t>𝒐𝒇</m:t>
                       </m:r>
                       <m:r>
-                        <a:rPr lang="en-US" sz="1400" b="1" i="1" dirty="0" smtClean="0"/>
+                        <a:rPr lang="en-US" sz="1400" b="1" i="1" dirty="0" smtClean="0">
+                          <a:latin typeface="Cambria Math" panose="02040503050406030204" pitchFamily="18" charset="0"/>
+                        </a:rPr>
                         <m:t> </m:t>
                       </m:r>
                       <m:r>
-                        <a:rPr lang="en-US" sz="1400" b="1" i="1" dirty="0" smtClean="0"/>
+                        <a:rPr lang="en-US" sz="1400" b="1" i="1" dirty="0" smtClean="0">
+                          <a:latin typeface="Cambria Math" panose="02040503050406030204" pitchFamily="18" charset="0"/>
+                        </a:rPr>
                         <m:t>𝒃𝒂𝒕𝒄𝒉</m:t>
                       </m:r>
                       <m:r>
-                        <a:rPr lang="en-US" sz="1400" b="1" i="1" dirty="0" smtClean="0"/>
+                        <a:rPr lang="en-US" sz="1400" b="1" i="1" dirty="0" smtClean="0">
+                          <a:latin typeface="Cambria Math" panose="02040503050406030204" pitchFamily="18" charset="0"/>
+                        </a:rPr>
                         <m:t> </m:t>
                       </m:r>
                       <m:r>
-                        <a:rPr lang="en-US" sz="1400" b="1" i="1" dirty="0" smtClean="0"/>
+                        <a:rPr lang="en-US" sz="1400" b="1" i="1" dirty="0" smtClean="0">
+                          <a:latin typeface="Cambria Math" panose="02040503050406030204" pitchFamily="18" charset="0"/>
+                        </a:rPr>
                         <m:t>𝑩</m:t>
                       </m:r>
                       <m:r>
-                        <a:rPr lang="en-US" sz="1400" b="1" i="1" dirty="0" smtClean="0"/>
+                        <a:rPr lang="en-US" sz="1400" b="1" i="1" dirty="0" smtClean="0">
+                          <a:latin typeface="Cambria Math" panose="02040503050406030204" pitchFamily="18" charset="0"/>
+                        </a:rPr>
                         <m:t> </m:t>
                       </m:r>
                     </m:oMath>
@@ -34243,48 +34461,56 @@
                     <m:oMath xmlns:m="http://schemas.openxmlformats.org/officeDocument/2006/math">
                       <m:r>
                         <a:rPr lang="en-US" sz="1400" b="0" i="1" smtClean="0">
+                          <a:latin typeface="Cambria Math" panose="02040503050406030204" pitchFamily="18" charset="0"/>
                           <a:ea typeface="Cambria Math" panose="02040503050406030204" pitchFamily="18" charset="0"/>
                         </a:rPr>
                         <m:t>𝑑𝑖𝑠𝑡𝑖𝑛𝑐𝑡</m:t>
                       </m:r>
                       <m:r>
                         <a:rPr lang="en-US" sz="1400" b="0" i="1" smtClean="0">
+                          <a:latin typeface="Cambria Math" panose="02040503050406030204" pitchFamily="18" charset="0"/>
                           <a:ea typeface="Cambria Math" panose="02040503050406030204" pitchFamily="18" charset="0"/>
                         </a:rPr>
                         <m:t>_</m:t>
                       </m:r>
                       <m:r>
                         <a:rPr lang="en-US" sz="1400" b="0" i="1" smtClean="0">
+                          <a:latin typeface="Cambria Math" panose="02040503050406030204" pitchFamily="18" charset="0"/>
                           <a:ea typeface="Cambria Math" panose="02040503050406030204" pitchFamily="18" charset="0"/>
                         </a:rPr>
                         <m:t>𝑘𝑚𝑒𝑟𝑠</m:t>
                       </m:r>
                       <m:r>
                         <a:rPr lang="en-US" sz="1400" b="0" i="1" smtClean="0">
+                          <a:latin typeface="Cambria Math" panose="02040503050406030204" pitchFamily="18" charset="0"/>
                           <a:ea typeface="Cambria Math" panose="02040503050406030204" pitchFamily="18" charset="0"/>
                         </a:rPr>
                         <m:t>(</m:t>
                       </m:r>
                       <m:r>
                         <a:rPr lang="en-US" sz="1400" b="0" i="1" smtClean="0">
+                          <a:latin typeface="Cambria Math" panose="02040503050406030204" pitchFamily="18" charset="0"/>
                           <a:ea typeface="Cambria Math" panose="02040503050406030204" pitchFamily="18" charset="0"/>
                         </a:rPr>
                         <m:t>𝑏𝑗</m:t>
                       </m:r>
                       <m:r>
                         <a:rPr lang="en-US" sz="1400" b="0" i="1" smtClean="0">
+                          <a:latin typeface="Cambria Math" panose="02040503050406030204" pitchFamily="18" charset="0"/>
                           <a:ea typeface="Cambria Math" panose="02040503050406030204" pitchFamily="18" charset="0"/>
                         </a:rPr>
                         <m:t>)&lt;</m:t>
                       </m:r>
                       <m:r>
                         <a:rPr lang="en-US" sz="1400" b="0" i="1" smtClean="0">
+                          <a:latin typeface="Cambria Math" panose="02040503050406030204" pitchFamily="18" charset="0"/>
                           <a:ea typeface="Cambria Math" panose="02040503050406030204" pitchFamily="18" charset="0"/>
                         </a:rPr>
                         <m:t>𝐶</m:t>
                       </m:r>
                       <m:r>
                         <a:rPr lang="vi-VN" sz="1400" b="1" i="1" smtClean="0">
+                          <a:latin typeface="Cambria Math" panose="02040503050406030204" pitchFamily="18" charset="0"/>
                           <a:ea typeface="Cambria Math" panose="02040503050406030204" pitchFamily="18" charset="0"/>
                         </a:rPr>
                         <m:t>,  </m:t>
@@ -34294,12 +34520,14 @@
                           <m:sty m:val="p"/>
                         </m:rPr>
                         <a:rPr lang="vi-VN" sz="1400" b="1" i="1" smtClean="0">
+                          <a:latin typeface="Cambria Math" panose="02040503050406030204" pitchFamily="18" charset="0"/>
                           <a:ea typeface="Cambria Math" panose="02040503050406030204" pitchFamily="18" charset="0"/>
                         </a:rPr>
                         <m:t>for</m:t>
                       </m:r>
                       <m:r>
                         <a:rPr lang="vi-VN" sz="1400" b="1" i="1" smtClean="0">
+                          <a:latin typeface="Cambria Math" panose="02040503050406030204" pitchFamily="18" charset="0"/>
                           <a:ea typeface="Cambria Math" panose="02040503050406030204" pitchFamily="18" charset="0"/>
                         </a:rPr>
                         <m:t> </m:t>
@@ -34307,7 +34535,9 @@
                       <m:d>
                         <m:dPr>
                           <m:ctrlPr>
-                            <a:rPr lang="vi-VN" sz="1400" b="1" i="1" dirty="0"/>
+                            <a:rPr lang="vi-VN" sz="1400" b="1" i="1" dirty="0">
+                              <a:latin typeface="Cambria Math" panose="02040503050406030204" pitchFamily="18" charset="0"/>
+                            </a:rPr>
                           </m:ctrlPr>
                         </m:dPr>
                         <m:e>
@@ -34315,19 +34545,27 @@
                             <m:rPr>
                               <m:sty m:val="p"/>
                             </m:rPr>
-                            <a:rPr lang="vi-VN" sz="1400" b="1" i="1" dirty="0"/>
+                            <a:rPr lang="vi-VN" sz="1400" b="1" i="1" dirty="0">
+                              <a:latin typeface="Cambria Math" panose="02040503050406030204" pitchFamily="18" charset="0"/>
+                            </a:rPr>
                             <m:t>j</m:t>
                           </m:r>
                           <m:r>
-                            <a:rPr lang="vi-VN" sz="1400" b="1" i="1" dirty="0"/>
+                            <a:rPr lang="vi-VN" sz="1400" b="1" i="1" dirty="0">
+                              <a:latin typeface="Cambria Math" panose="02040503050406030204" pitchFamily="18" charset="0"/>
+                            </a:rPr>
                             <m:t>=</m:t>
                           </m:r>
                           <m:r>
-                            <a:rPr lang="vi-VN" sz="1400" i="1" dirty="0"/>
+                            <a:rPr lang="vi-VN" sz="1400" i="1" dirty="0">
+                              <a:latin typeface="Cambria Math" panose="02040503050406030204" pitchFamily="18" charset="0"/>
+                            </a:rPr>
                             <m:t>1</m:t>
                           </m:r>
                           <m:r>
-                            <a:rPr lang="vi-VN" sz="1400" b="1" i="1" dirty="0"/>
+                            <a:rPr lang="vi-VN" sz="1400" b="1" i="1" dirty="0">
+                              <a:latin typeface="Cambria Math" panose="02040503050406030204" pitchFamily="18" charset="0"/>
+                            </a:rPr>
                             <m:t>,…,</m:t>
                           </m:r>
                           <m:r>
@@ -34346,7 +34584,7 @@
             </p:txBody>
           </p:sp>
         </mc:Choice>
-        <mc:Fallback>
+        <mc:Fallback xmlns="">
           <p:sp>
             <p:nvSpPr>
               <p:cNvPr id="5" name="Content Placeholder 2">
@@ -34974,6 +35212,70 @@
           </a:p>
         </p:txBody>
       </p:sp>
+      <p:sp>
+        <p:nvSpPr>
+          <p:cNvPr id="12" name="Rectangle 11">
+            <a:extLst>
+              <a:ext uri="{FF2B5EF4-FFF2-40B4-BE49-F238E27FC236}">
+                <a16:creationId xmlns:a16="http://schemas.microsoft.com/office/drawing/2014/main" id="{DD8FD58D-5052-9B70-B61B-1B1173796749}"/>
+              </a:ext>
+            </a:extLst>
+          </p:cNvPr>
+          <p:cNvSpPr/>
+          <p:nvPr/>
+        </p:nvSpPr>
+        <p:spPr>
+          <a:xfrm>
+            <a:off x="7807629" y="2906591"/>
+            <a:ext cx="3709639" cy="1673690"/>
+          </a:xfrm>
+          <a:prstGeom prst="rect">
+            <a:avLst/>
+          </a:prstGeom>
+        </p:spPr>
+        <p:style>
+          <a:lnRef idx="2">
+            <a:schemeClr val="dk1"/>
+          </a:lnRef>
+          <a:fillRef idx="1">
+            <a:schemeClr val="lt1"/>
+          </a:fillRef>
+          <a:effectRef idx="0">
+            <a:schemeClr val="dk1"/>
+          </a:effectRef>
+          <a:fontRef idx="minor">
+            <a:schemeClr val="dk1"/>
+          </a:fontRef>
+        </p:style>
+        <p:txBody>
+          <a:bodyPr rtlCol="0" anchor="ctr"/>
+          <a:lstStyle/>
+          <a:p>
+            <a:pPr lvl="0"/>
+            <a:r>
+              <a:rPr lang="en-US" sz="1800" kern="100" dirty="0">
+                <a:solidFill>
+                  <a:srgbClr val="C00000"/>
+                </a:solidFill>
+                <a:effectLst/>
+                <a:latin typeface="Calibri" panose="020F0502020204030204" pitchFamily="34" charset="0"/>
+                <a:ea typeface="Calibri" panose="020F0502020204030204" pitchFamily="34" charset="0"/>
+                <a:cs typeface="Times New Roman" panose="02020603050405020304" pitchFamily="18" charset="0"/>
+              </a:rPr>
+              <a:t>Explain better strategy 2 </a:t>
+            </a:r>
+            <a:endParaRPr lang="en-FR" sz="1800" kern="100" dirty="0">
+              <a:solidFill>
+                <a:srgbClr val="C00000"/>
+              </a:solidFill>
+              <a:effectLst/>
+              <a:latin typeface="Calibri" panose="020F0502020204030204" pitchFamily="34" charset="0"/>
+              <a:ea typeface="Calibri" panose="020F0502020204030204" pitchFamily="34" charset="0"/>
+              <a:cs typeface="Times New Roman" panose="02020603050405020304" pitchFamily="18" charset="0"/>
+            </a:endParaRPr>
+          </a:p>
+        </p:txBody>
+      </p:sp>
     </p:spTree>
     <p:extLst>
       <p:ext uri="{BB962C8B-B14F-4D97-AF65-F5344CB8AC3E}">
@@ -35545,6 +35847,70 @@
           </a:p>
         </p:txBody>
       </p:sp>
+      <p:sp>
+        <p:nvSpPr>
+          <p:cNvPr id="8" name="Rectangle 7">
+            <a:extLst>
+              <a:ext uri="{FF2B5EF4-FFF2-40B4-BE49-F238E27FC236}">
+                <a16:creationId xmlns:a16="http://schemas.microsoft.com/office/drawing/2014/main" id="{013AECE8-969C-7899-71A1-6F0FC9BB4EB1}"/>
+              </a:ext>
+            </a:extLst>
+          </p:cNvPr>
+          <p:cNvSpPr/>
+          <p:nvPr/>
+        </p:nvSpPr>
+        <p:spPr>
+          <a:xfrm>
+            <a:off x="7807629" y="2906591"/>
+            <a:ext cx="3709639" cy="1673690"/>
+          </a:xfrm>
+          <a:prstGeom prst="rect">
+            <a:avLst/>
+          </a:prstGeom>
+        </p:spPr>
+        <p:style>
+          <a:lnRef idx="2">
+            <a:schemeClr val="dk1"/>
+          </a:lnRef>
+          <a:fillRef idx="1">
+            <a:schemeClr val="lt1"/>
+          </a:fillRef>
+          <a:effectRef idx="0">
+            <a:schemeClr val="dk1"/>
+          </a:effectRef>
+          <a:fontRef idx="minor">
+            <a:schemeClr val="dk1"/>
+          </a:fontRef>
+        </p:style>
+        <p:txBody>
+          <a:bodyPr rtlCol="0" anchor="ctr"/>
+          <a:lstStyle/>
+          <a:p>
+            <a:pPr lvl="0"/>
+            <a:r>
+              <a:rPr lang="en-US" sz="1800" kern="100" dirty="0">
+                <a:solidFill>
+                  <a:srgbClr val="C00000"/>
+                </a:solidFill>
+                <a:effectLst/>
+                <a:latin typeface="Calibri" panose="020F0502020204030204" pitchFamily="34" charset="0"/>
+                <a:ea typeface="Calibri" panose="020F0502020204030204" pitchFamily="34" charset="0"/>
+                <a:cs typeface="Times New Roman" panose="02020603050405020304" pitchFamily="18" charset="0"/>
+              </a:rPr>
+              <a:t>Compare with original batching</a:t>
+            </a:r>
+            <a:endParaRPr lang="en-FR" sz="1800" kern="100" dirty="0">
+              <a:solidFill>
+                <a:srgbClr val="C00000"/>
+              </a:solidFill>
+              <a:effectLst/>
+              <a:latin typeface="Calibri" panose="020F0502020204030204" pitchFamily="34" charset="0"/>
+              <a:ea typeface="Calibri" panose="020F0502020204030204" pitchFamily="34" charset="0"/>
+              <a:cs typeface="Times New Roman" panose="02020603050405020304" pitchFamily="18" charset="0"/>
+            </a:endParaRPr>
+          </a:p>
+        </p:txBody>
+      </p:sp>
     </p:spTree>
     <p:extLst>
       <p:ext uri="{BB962C8B-B14F-4D97-AF65-F5344CB8AC3E}">
@@ -36035,6 +36401,70 @@
           </a:p>
         </p:txBody>
       </p:sp>
+      <p:sp>
+        <p:nvSpPr>
+          <p:cNvPr id="3" name="Rectangle 2">
+            <a:extLst>
+              <a:ext uri="{FF2B5EF4-FFF2-40B4-BE49-F238E27FC236}">
+                <a16:creationId xmlns:a16="http://schemas.microsoft.com/office/drawing/2014/main" id="{BFE58C36-2CDE-538A-D50C-F0C88CB75E59}"/>
+              </a:ext>
+            </a:extLst>
+          </p:cNvPr>
+          <p:cNvSpPr/>
+          <p:nvPr/>
+        </p:nvSpPr>
+        <p:spPr>
+          <a:xfrm>
+            <a:off x="7807629" y="2906591"/>
+            <a:ext cx="3709639" cy="1673690"/>
+          </a:xfrm>
+          <a:prstGeom prst="rect">
+            <a:avLst/>
+          </a:prstGeom>
+        </p:spPr>
+        <p:style>
+          <a:lnRef idx="2">
+            <a:schemeClr val="dk1"/>
+          </a:lnRef>
+          <a:fillRef idx="1">
+            <a:schemeClr val="lt1"/>
+          </a:fillRef>
+          <a:effectRef idx="0">
+            <a:schemeClr val="dk1"/>
+          </a:effectRef>
+          <a:fontRef idx="minor">
+            <a:schemeClr val="dk1"/>
+          </a:fontRef>
+        </p:style>
+        <p:txBody>
+          <a:bodyPr rtlCol="0" anchor="ctr"/>
+          <a:lstStyle/>
+          <a:p>
+            <a:pPr lvl="0"/>
+            <a:r>
+              <a:rPr lang="en-US" sz="1800" kern="100" dirty="0">
+                <a:solidFill>
+                  <a:srgbClr val="C00000"/>
+                </a:solidFill>
+                <a:effectLst/>
+                <a:latin typeface="Calibri" panose="020F0502020204030204" pitchFamily="34" charset="0"/>
+                <a:ea typeface="Calibri" panose="020F0502020204030204" pitchFamily="34" charset="0"/>
+                <a:cs typeface="Times New Roman" panose="02020603050405020304" pitchFamily="18" charset="0"/>
+              </a:rPr>
+              <a:t>Compare with original batching</a:t>
+            </a:r>
+            <a:endParaRPr lang="en-FR" sz="1800" kern="100" dirty="0">
+              <a:solidFill>
+                <a:srgbClr val="C00000"/>
+              </a:solidFill>
+              <a:effectLst/>
+              <a:latin typeface="Calibri" panose="020F0502020204030204" pitchFamily="34" charset="0"/>
+              <a:ea typeface="Calibri" panose="020F0502020204030204" pitchFamily="34" charset="0"/>
+              <a:cs typeface="Times New Roman" panose="02020603050405020304" pitchFamily="18" charset="0"/>
+            </a:endParaRPr>
+          </a:p>
+        </p:txBody>
+      </p:sp>
     </p:spTree>
     <p:extLst>
       <p:ext uri="{BB962C8B-B14F-4D97-AF65-F5344CB8AC3E}">
@@ -36369,6 +36799,70 @@
               <a:t>Number of genomes per batch varies, strat.2 to a lesser extent compared to strat.1</a:t>
             </a:r>
             <a:endParaRPr lang="en-FR" dirty="0"/>
+          </a:p>
+        </p:txBody>
+      </p:sp>
+      <p:sp>
+        <p:nvSpPr>
+          <p:cNvPr id="3" name="Rectangle 2">
+            <a:extLst>
+              <a:ext uri="{FF2B5EF4-FFF2-40B4-BE49-F238E27FC236}">
+                <a16:creationId xmlns:a16="http://schemas.microsoft.com/office/drawing/2014/main" id="{04A136B7-D3C4-E339-F6B1-FED76686457B}"/>
+              </a:ext>
+            </a:extLst>
+          </p:cNvPr>
+          <p:cNvSpPr/>
+          <p:nvPr/>
+        </p:nvSpPr>
+        <p:spPr>
+          <a:xfrm>
+            <a:off x="7807629" y="2906591"/>
+            <a:ext cx="3709639" cy="1673690"/>
+          </a:xfrm>
+          <a:prstGeom prst="rect">
+            <a:avLst/>
+          </a:prstGeom>
+        </p:spPr>
+        <p:style>
+          <a:lnRef idx="2">
+            <a:schemeClr val="dk1"/>
+          </a:lnRef>
+          <a:fillRef idx="1">
+            <a:schemeClr val="lt1"/>
+          </a:fillRef>
+          <a:effectRef idx="0">
+            <a:schemeClr val="dk1"/>
+          </a:effectRef>
+          <a:fontRef idx="minor">
+            <a:schemeClr val="dk1"/>
+          </a:fontRef>
+        </p:style>
+        <p:txBody>
+          <a:bodyPr rtlCol="0" anchor="ctr"/>
+          <a:lstStyle/>
+          <a:p>
+            <a:pPr lvl="0"/>
+            <a:r>
+              <a:rPr lang="en-US" sz="1800" kern="100" dirty="0">
+                <a:solidFill>
+                  <a:srgbClr val="C00000"/>
+                </a:solidFill>
+                <a:effectLst/>
+                <a:latin typeface="Calibri" panose="020F0502020204030204" pitchFamily="34" charset="0"/>
+                <a:ea typeface="Calibri" panose="020F0502020204030204" pitchFamily="34" charset="0"/>
+                <a:cs typeface="Times New Roman" panose="02020603050405020304" pitchFamily="18" charset="0"/>
+              </a:rPr>
+              <a:t>Compare with original batching</a:t>
+            </a:r>
+            <a:endParaRPr lang="en-FR" sz="1800" kern="100" dirty="0">
+              <a:solidFill>
+                <a:srgbClr val="C00000"/>
+              </a:solidFill>
+              <a:effectLst/>
+              <a:latin typeface="Calibri" panose="020F0502020204030204" pitchFamily="34" charset="0"/>
+              <a:ea typeface="Calibri" panose="020F0502020204030204" pitchFamily="34" charset="0"/>
+              <a:cs typeface="Times New Roman" panose="02020603050405020304" pitchFamily="18" charset="0"/>
+            </a:endParaRPr>
           </a:p>
         </p:txBody>
       </p:sp>
@@ -36679,6 +37173,70 @@
           </a:p>
         </p:txBody>
       </p:sp>
+      <p:sp>
+        <p:nvSpPr>
+          <p:cNvPr id="3" name="Rectangle 2">
+            <a:extLst>
+              <a:ext uri="{FF2B5EF4-FFF2-40B4-BE49-F238E27FC236}">
+                <a16:creationId xmlns:a16="http://schemas.microsoft.com/office/drawing/2014/main" id="{E214EF05-010D-5691-3510-FDBEADC48BCB}"/>
+              </a:ext>
+            </a:extLst>
+          </p:cNvPr>
+          <p:cNvSpPr/>
+          <p:nvPr/>
+        </p:nvSpPr>
+        <p:spPr>
+          <a:xfrm>
+            <a:off x="7807629" y="2906591"/>
+            <a:ext cx="3709639" cy="1673690"/>
+          </a:xfrm>
+          <a:prstGeom prst="rect">
+            <a:avLst/>
+          </a:prstGeom>
+        </p:spPr>
+        <p:style>
+          <a:lnRef idx="2">
+            <a:schemeClr val="dk1"/>
+          </a:lnRef>
+          <a:fillRef idx="1">
+            <a:schemeClr val="lt1"/>
+          </a:fillRef>
+          <a:effectRef idx="0">
+            <a:schemeClr val="dk1"/>
+          </a:effectRef>
+          <a:fontRef idx="minor">
+            <a:schemeClr val="dk1"/>
+          </a:fontRef>
+        </p:style>
+        <p:txBody>
+          <a:bodyPr rtlCol="0" anchor="ctr"/>
+          <a:lstStyle/>
+          <a:p>
+            <a:pPr lvl="0"/>
+            <a:r>
+              <a:rPr lang="en-US" sz="1800" kern="100" dirty="0">
+                <a:solidFill>
+                  <a:srgbClr val="C00000"/>
+                </a:solidFill>
+                <a:effectLst/>
+                <a:latin typeface="Calibri" panose="020F0502020204030204" pitchFamily="34" charset="0"/>
+                <a:ea typeface="Calibri" panose="020F0502020204030204" pitchFamily="34" charset="0"/>
+                <a:cs typeface="Times New Roman" panose="02020603050405020304" pitchFamily="18" charset="0"/>
+              </a:rPr>
+              <a:t>Compare with original batching</a:t>
+            </a:r>
+            <a:endParaRPr lang="en-FR" sz="1800" kern="100" dirty="0">
+              <a:solidFill>
+                <a:srgbClr val="C00000"/>
+              </a:solidFill>
+              <a:effectLst/>
+              <a:latin typeface="Calibri" panose="020F0502020204030204" pitchFamily="34" charset="0"/>
+              <a:ea typeface="Calibri" panose="020F0502020204030204" pitchFamily="34" charset="0"/>
+              <a:cs typeface="Times New Roman" panose="02020603050405020304" pitchFamily="18" charset="0"/>
+            </a:endParaRPr>
+          </a:p>
+        </p:txBody>
+      </p:sp>
     </p:spTree>
     <p:extLst>
       <p:ext uri="{BB962C8B-B14F-4D97-AF65-F5344CB8AC3E}">
@@ -36743,8 +37301,8 @@
           </a:p>
         </p:txBody>
       </p:sp>
-      <mc:AlternateContent xmlns:mc="http://schemas.openxmlformats.org/markup-compatibility/2006">
-        <mc:Choice xmlns:a14="http://schemas.microsoft.com/office/drawing/2010/main" Requires="a14">
+      <mc:AlternateContent xmlns:mc="http://schemas.openxmlformats.org/markup-compatibility/2006" xmlns:a14="http://schemas.microsoft.com/office/drawing/2010/main">
+        <mc:Choice Requires="a14">
           <p:sp>
             <p:nvSpPr>
               <p:cNvPr id="6" name="Content Placeholder 5">
@@ -36928,7 +37486,7 @@
             </p:txBody>
           </p:sp>
         </mc:Choice>
-        <mc:Fallback>
+        <mc:Fallback xmlns="">
           <p:sp>
             <p:nvSpPr>
               <p:cNvPr id="6" name="Content Placeholder 5">
@@ -37925,6 +38483,70 @@
           </a:p>
         </p:txBody>
       </p:sp>
+      <p:sp>
+        <p:nvSpPr>
+          <p:cNvPr id="3" name="Rectangle 2">
+            <a:extLst>
+              <a:ext uri="{FF2B5EF4-FFF2-40B4-BE49-F238E27FC236}">
+                <a16:creationId xmlns:a16="http://schemas.microsoft.com/office/drawing/2014/main" id="{782AE3AA-B24B-0164-6C29-15F61DDF1BE6}"/>
+              </a:ext>
+            </a:extLst>
+          </p:cNvPr>
+          <p:cNvSpPr/>
+          <p:nvPr/>
+        </p:nvSpPr>
+        <p:spPr>
+          <a:xfrm>
+            <a:off x="7807629" y="2906591"/>
+            <a:ext cx="3709639" cy="1673690"/>
+          </a:xfrm>
+          <a:prstGeom prst="rect">
+            <a:avLst/>
+          </a:prstGeom>
+        </p:spPr>
+        <p:style>
+          <a:lnRef idx="2">
+            <a:schemeClr val="dk1"/>
+          </a:lnRef>
+          <a:fillRef idx="1">
+            <a:schemeClr val="lt1"/>
+          </a:fillRef>
+          <a:effectRef idx="0">
+            <a:schemeClr val="dk1"/>
+          </a:effectRef>
+          <a:fontRef idx="minor">
+            <a:schemeClr val="dk1"/>
+          </a:fontRef>
+        </p:style>
+        <p:txBody>
+          <a:bodyPr rtlCol="0" anchor="ctr"/>
+          <a:lstStyle/>
+          <a:p>
+            <a:pPr lvl="0"/>
+            <a:r>
+              <a:rPr lang="en-US" sz="1800" kern="100" dirty="0">
+                <a:solidFill>
+                  <a:srgbClr val="C00000"/>
+                </a:solidFill>
+                <a:effectLst/>
+                <a:latin typeface="Calibri" panose="020F0502020204030204" pitchFamily="34" charset="0"/>
+                <a:ea typeface="Calibri" panose="020F0502020204030204" pitchFamily="34" charset="0"/>
+                <a:cs typeface="Times New Roman" panose="02020603050405020304" pitchFamily="18" charset="0"/>
+              </a:rPr>
+              <a:t>Compare with original batching</a:t>
+            </a:r>
+            <a:endParaRPr lang="en-FR" sz="1800" kern="100" dirty="0">
+              <a:solidFill>
+                <a:srgbClr val="C00000"/>
+              </a:solidFill>
+              <a:effectLst/>
+              <a:latin typeface="Calibri" panose="020F0502020204030204" pitchFamily="34" charset="0"/>
+              <a:ea typeface="Calibri" panose="020F0502020204030204" pitchFamily="34" charset="0"/>
+              <a:cs typeface="Times New Roman" panose="02020603050405020304" pitchFamily="18" charset="0"/>
+            </a:endParaRPr>
+          </a:p>
+        </p:txBody>
+      </p:sp>
     </p:spTree>
     <p:extLst>
       <p:ext uri="{BB962C8B-B14F-4D97-AF65-F5344CB8AC3E}">
@@ -38262,6 +38884,70 @@
               <a:solidFill>
                 <a:schemeClr val="tx1"/>
               </a:solidFill>
+            </a:endParaRPr>
+          </a:p>
+        </p:txBody>
+      </p:sp>
+      <p:sp>
+        <p:nvSpPr>
+          <p:cNvPr id="3" name="Rectangle 2">
+            <a:extLst>
+              <a:ext uri="{FF2B5EF4-FFF2-40B4-BE49-F238E27FC236}">
+                <a16:creationId xmlns:a16="http://schemas.microsoft.com/office/drawing/2014/main" id="{12F5D171-3244-521B-F489-18D0B6210630}"/>
+              </a:ext>
+            </a:extLst>
+          </p:cNvPr>
+          <p:cNvSpPr/>
+          <p:nvPr/>
+        </p:nvSpPr>
+        <p:spPr>
+          <a:xfrm>
+            <a:off x="7807629" y="2906591"/>
+            <a:ext cx="3709639" cy="1673690"/>
+          </a:xfrm>
+          <a:prstGeom prst="rect">
+            <a:avLst/>
+          </a:prstGeom>
+        </p:spPr>
+        <p:style>
+          <a:lnRef idx="2">
+            <a:schemeClr val="dk1"/>
+          </a:lnRef>
+          <a:fillRef idx="1">
+            <a:schemeClr val="lt1"/>
+          </a:fillRef>
+          <a:effectRef idx="0">
+            <a:schemeClr val="dk1"/>
+          </a:effectRef>
+          <a:fontRef idx="minor">
+            <a:schemeClr val="dk1"/>
+          </a:fontRef>
+        </p:style>
+        <p:txBody>
+          <a:bodyPr rtlCol="0" anchor="ctr"/>
+          <a:lstStyle/>
+          <a:p>
+            <a:pPr lvl="0"/>
+            <a:r>
+              <a:rPr lang="en-US" sz="1800" kern="100" dirty="0">
+                <a:solidFill>
+                  <a:srgbClr val="C00000"/>
+                </a:solidFill>
+                <a:effectLst/>
+                <a:latin typeface="Calibri" panose="020F0502020204030204" pitchFamily="34" charset="0"/>
+                <a:ea typeface="Calibri" panose="020F0502020204030204" pitchFamily="34" charset="0"/>
+                <a:cs typeface="Times New Roman" panose="02020603050405020304" pitchFamily="18" charset="0"/>
+              </a:rPr>
+              <a:t>Compare with original batching</a:t>
+            </a:r>
+            <a:endParaRPr lang="en-FR" sz="1800" kern="100" dirty="0">
+              <a:solidFill>
+                <a:srgbClr val="C00000"/>
+              </a:solidFill>
+              <a:effectLst/>
+              <a:latin typeface="Calibri" panose="020F0502020204030204" pitchFamily="34" charset="0"/>
+              <a:ea typeface="Calibri" panose="020F0502020204030204" pitchFamily="34" charset="0"/>
+              <a:cs typeface="Times New Roman" panose="02020603050405020304" pitchFamily="18" charset="0"/>
             </a:endParaRPr>
           </a:p>
         </p:txBody>

</xml_diff>